<commit_message>
Add introduction lecture nodes
</commit_message>
<xml_diff>
--- a/01-05-introduction.pptx
+++ b/01-05-introduction.pptx
@@ -15,20 +15,21 @@
     <p:sldId id="264" r:id="rId9"/>
     <p:sldId id="263" r:id="rId10"/>
     <p:sldId id="265" r:id="rId11"/>
-    <p:sldId id="266" r:id="rId12"/>
-    <p:sldId id="267" r:id="rId13"/>
-    <p:sldId id="268" r:id="rId14"/>
-    <p:sldId id="269" r:id="rId15"/>
-    <p:sldId id="270" r:id="rId16"/>
-    <p:sldId id="271" r:id="rId17"/>
-    <p:sldId id="273" r:id="rId18"/>
-    <p:sldId id="275" r:id="rId19"/>
-    <p:sldId id="274" r:id="rId20"/>
-    <p:sldId id="276" r:id="rId21"/>
-    <p:sldId id="277" r:id="rId22"/>
-    <p:sldId id="278" r:id="rId23"/>
-    <p:sldId id="279" r:id="rId24"/>
-    <p:sldId id="280" r:id="rId25"/>
+    <p:sldId id="281" r:id="rId12"/>
+    <p:sldId id="266" r:id="rId13"/>
+    <p:sldId id="267" r:id="rId14"/>
+    <p:sldId id="268" r:id="rId15"/>
+    <p:sldId id="269" r:id="rId16"/>
+    <p:sldId id="270" r:id="rId17"/>
+    <p:sldId id="271" r:id="rId18"/>
+    <p:sldId id="273" r:id="rId19"/>
+    <p:sldId id="275" r:id="rId20"/>
+    <p:sldId id="274" r:id="rId21"/>
+    <p:sldId id="276" r:id="rId22"/>
+    <p:sldId id="277" r:id="rId23"/>
+    <p:sldId id="278" r:id="rId24"/>
+    <p:sldId id="279" r:id="rId25"/>
+    <p:sldId id="280" r:id="rId26"/>
   </p:sldIdLst>
   <p:sldSz cx="9144000" cy="6858000" type="screen4x3"/>
   <p:notesSz cx="6858000" cy="9144000"/>
@@ -3187,7 +3188,7 @@
           <a:p>
             <a:fld id="{76F45327-4099-2C4F-852C-B55AF92B7D99}" type="datetimeFigureOut">
               <a:rPr lang="en-US" smtClean="0"/>
-              <a:t>1/4/16</a:t>
+              <a:t>1/5/16</a:t>
             </a:fld>
             <a:endParaRPr lang="en-US"/>
           </a:p>
@@ -3395,7 +3396,7 @@
           <a:p>
             <a:fld id="{76F45327-4099-2C4F-852C-B55AF92B7D99}" type="datetimeFigureOut">
               <a:rPr lang="en-US" smtClean="0"/>
-              <a:t>1/4/16</a:t>
+              <a:t>1/5/16</a:t>
             </a:fld>
             <a:endParaRPr lang="en-US"/>
           </a:p>
@@ -3651,7 +3652,7 @@
           <a:p>
             <a:fld id="{76F45327-4099-2C4F-852C-B55AF92B7D99}" type="datetimeFigureOut">
               <a:rPr lang="en-US" smtClean="0"/>
-              <a:t>1/4/16</a:t>
+              <a:t>1/5/16</a:t>
             </a:fld>
             <a:endParaRPr lang="en-US"/>
           </a:p>
@@ -3843,7 +3844,7 @@
           <a:p>
             <a:fld id="{76F45327-4099-2C4F-852C-B55AF92B7D99}" type="datetimeFigureOut">
               <a:rPr lang="en-US" smtClean="0"/>
-              <a:t>1/4/16</a:t>
+              <a:t>1/5/16</a:t>
             </a:fld>
             <a:endParaRPr lang="en-US"/>
           </a:p>
@@ -4013,7 +4014,7 @@
           <a:p>
             <a:fld id="{76F45327-4099-2C4F-852C-B55AF92B7D99}" type="datetimeFigureOut">
               <a:rPr lang="en-US" smtClean="0"/>
-              <a:t>1/4/16</a:t>
+              <a:t>1/5/16</a:t>
             </a:fld>
             <a:endParaRPr lang="en-US"/>
           </a:p>
@@ -4259,7 +4260,7 @@
           <a:p>
             <a:fld id="{76F45327-4099-2C4F-852C-B55AF92B7D99}" type="datetimeFigureOut">
               <a:rPr lang="en-US" smtClean="0"/>
-              <a:t>1/4/16</a:t>
+              <a:t>1/5/16</a:t>
             </a:fld>
             <a:endParaRPr lang="en-US"/>
           </a:p>
@@ -4491,7 +4492,7 @@
           <a:p>
             <a:fld id="{76F45327-4099-2C4F-852C-B55AF92B7D99}" type="datetimeFigureOut">
               <a:rPr lang="en-US" smtClean="0"/>
-              <a:t>1/4/16</a:t>
+              <a:t>1/5/16</a:t>
             </a:fld>
             <a:endParaRPr lang="en-US"/>
           </a:p>
@@ -4858,7 +4859,7 @@
           <a:p>
             <a:fld id="{76F45327-4099-2C4F-852C-B55AF92B7D99}" type="datetimeFigureOut">
               <a:rPr lang="en-US" smtClean="0"/>
-              <a:t>1/4/16</a:t>
+              <a:t>1/5/16</a:t>
             </a:fld>
             <a:endParaRPr lang="en-US"/>
           </a:p>
@@ -4976,7 +4977,7 @@
           <a:p>
             <a:fld id="{76F45327-4099-2C4F-852C-B55AF92B7D99}" type="datetimeFigureOut">
               <a:rPr lang="en-US" smtClean="0"/>
-              <a:t>1/4/16</a:t>
+              <a:t>1/5/16</a:t>
             </a:fld>
             <a:endParaRPr lang="en-US"/>
           </a:p>
@@ -5071,7 +5072,7 @@
           <a:p>
             <a:fld id="{76F45327-4099-2C4F-852C-B55AF92B7D99}" type="datetimeFigureOut">
               <a:rPr lang="en-US" smtClean="0"/>
-              <a:t>1/4/16</a:t>
+              <a:t>1/5/16</a:t>
             </a:fld>
             <a:endParaRPr lang="en-US"/>
           </a:p>
@@ -5348,7 +5349,7 @@
           <a:p>
             <a:fld id="{76F45327-4099-2C4F-852C-B55AF92B7D99}" type="datetimeFigureOut">
               <a:rPr lang="en-US" smtClean="0"/>
-              <a:t>1/4/16</a:t>
+              <a:t>1/5/16</a:t>
             </a:fld>
             <a:endParaRPr lang="en-US"/>
           </a:p>
@@ -5518,7 +5519,7 @@
           <a:p>
             <a:fld id="{76F45327-4099-2C4F-852C-B55AF92B7D99}" type="datetimeFigureOut">
               <a:rPr lang="en-US" smtClean="0"/>
-              <a:t>1/4/16</a:t>
+              <a:t>1/5/16</a:t>
             </a:fld>
             <a:endParaRPr lang="en-US"/>
           </a:p>
@@ -5771,7 +5772,7 @@
           <a:p>
             <a:fld id="{76F45327-4099-2C4F-852C-B55AF92B7D99}" type="datetimeFigureOut">
               <a:rPr lang="en-US" smtClean="0"/>
-              <a:t>1/4/16</a:t>
+              <a:t>1/5/16</a:t>
             </a:fld>
             <a:endParaRPr lang="en-US"/>
           </a:p>
@@ -5941,7 +5942,7 @@
           <a:p>
             <a:fld id="{76F45327-4099-2C4F-852C-B55AF92B7D99}" type="datetimeFigureOut">
               <a:rPr lang="en-US" smtClean="0"/>
-              <a:t>1/4/16</a:t>
+              <a:t>1/5/16</a:t>
             </a:fld>
             <a:endParaRPr lang="en-US"/>
           </a:p>
@@ -6121,7 +6122,7 @@
           <a:p>
             <a:fld id="{76F45327-4099-2C4F-852C-B55AF92B7D99}" type="datetimeFigureOut">
               <a:rPr lang="en-US" smtClean="0"/>
-              <a:t>1/4/16</a:t>
+              <a:t>1/5/16</a:t>
             </a:fld>
             <a:endParaRPr lang="en-US"/>
           </a:p>
@@ -6464,7 +6465,7 @@
           <a:p>
             <a:fld id="{76F45327-4099-2C4F-852C-B55AF92B7D99}" type="datetimeFigureOut">
               <a:rPr lang="en-US" smtClean="0"/>
-              <a:t>1/4/16</a:t>
+              <a:t>1/5/16</a:t>
             </a:fld>
             <a:endParaRPr lang="en-US"/>
           </a:p>
@@ -6739,7 +6740,7 @@
           <a:p>
             <a:fld id="{76F45327-4099-2C4F-852C-B55AF92B7D99}" type="datetimeFigureOut">
               <a:rPr lang="en-US" smtClean="0"/>
-              <a:t>1/4/16</a:t>
+              <a:t>1/5/16</a:t>
             </a:fld>
             <a:endParaRPr lang="en-US"/>
           </a:p>
@@ -7118,7 +7119,7 @@
           <a:p>
             <a:fld id="{76F45327-4099-2C4F-852C-B55AF92B7D99}" type="datetimeFigureOut">
               <a:rPr lang="en-US" smtClean="0"/>
-              <a:t>1/4/16</a:t>
+              <a:t>1/5/16</a:t>
             </a:fld>
             <a:endParaRPr lang="en-US"/>
           </a:p>
@@ -7236,7 +7237,7 @@
           <a:p>
             <a:fld id="{76F45327-4099-2C4F-852C-B55AF92B7D99}" type="datetimeFigureOut">
               <a:rPr lang="en-US" smtClean="0"/>
-              <a:t>1/4/16</a:t>
+              <a:t>1/5/16</a:t>
             </a:fld>
             <a:endParaRPr lang="en-US"/>
           </a:p>
@@ -7407,7 +7408,7 @@
           <a:p>
             <a:fld id="{76F45327-4099-2C4F-852C-B55AF92B7D99}" type="datetimeFigureOut">
               <a:rPr lang="en-US" smtClean="0"/>
-              <a:t>1/4/16</a:t>
+              <a:t>1/5/16</a:t>
             </a:fld>
             <a:endParaRPr lang="en-US"/>
           </a:p>
@@ -7761,7 +7762,7 @@
           <a:p>
             <a:fld id="{76F45327-4099-2C4F-852C-B55AF92B7D99}" type="datetimeFigureOut">
               <a:rPr lang="en-US" smtClean="0"/>
-              <a:t>1/4/16</a:t>
+              <a:t>1/5/16</a:t>
             </a:fld>
             <a:endParaRPr lang="en-US"/>
           </a:p>
@@ -8138,7 +8139,7 @@
           <a:p>
             <a:fld id="{76F45327-4099-2C4F-852C-B55AF92B7D99}" type="datetimeFigureOut">
               <a:rPr lang="en-US" smtClean="0"/>
-              <a:t>1/4/16</a:t>
+              <a:t>1/5/16</a:t>
             </a:fld>
             <a:endParaRPr lang="en-US"/>
           </a:p>
@@ -8425,7 +8426,7 @@
           <a:p>
             <a:fld id="{76F45327-4099-2C4F-852C-B55AF92B7D99}" type="datetimeFigureOut">
               <a:rPr lang="en-US" smtClean="0"/>
-              <a:t>1/4/16</a:t>
+              <a:t>1/5/16</a:t>
             </a:fld>
             <a:endParaRPr lang="en-US"/>
           </a:p>
@@ -9084,7 +9085,7 @@
           <a:p>
             <a:fld id="{76F45327-4099-2C4F-852C-B55AF92B7D99}" type="datetimeFigureOut">
               <a:rPr lang="en-US" smtClean="0"/>
-              <a:t>1/4/16</a:t>
+              <a:t>1/5/16</a:t>
             </a:fld>
             <a:endParaRPr lang="en-US"/>
           </a:p>
@@ -9599,10 +9600,414 @@
   <p:clrMapOvr>
     <a:masterClrMapping/>
   </p:clrMapOvr>
+  <p:timing>
+    <p:tnLst>
+      <p:par>
+        <p:cTn id="1" dur="indefinite" restart="never" nodeType="tmRoot"/>
+      </p:par>
+    </p:tnLst>
+  </p:timing>
 </p:sld>
 </file>
 
 <file path=ppt/slides/slide10.xml><?xml version="1.0" encoding="utf-8"?>
+<p:sld xmlns:a="http://schemas.openxmlformats.org/drawingml/2006/main" xmlns:r="http://schemas.openxmlformats.org/officeDocument/2006/relationships" xmlns:p="http://schemas.openxmlformats.org/presentationml/2006/main">
+  <p:cSld>
+    <p:spTree>
+      <p:nvGrpSpPr>
+        <p:cNvPr id="1" name=""/>
+        <p:cNvGrpSpPr/>
+        <p:nvPr/>
+      </p:nvGrpSpPr>
+      <p:grpSpPr>
+        <a:xfrm>
+          <a:off x="0" y="0"/>
+          <a:ext cx="0" cy="0"/>
+          <a:chOff x="0" y="0"/>
+          <a:chExt cx="0" cy="0"/>
+        </a:xfrm>
+      </p:grpSpPr>
+      <p:sp>
+        <p:nvSpPr>
+          <p:cNvPr id="2" name="Title 1"/>
+          <p:cNvSpPr txBox="1">
+            <a:spLocks/>
+          </p:cNvSpPr>
+          <p:nvPr/>
+        </p:nvSpPr>
+        <p:spPr>
+          <a:xfrm>
+            <a:off x="800100" y="267460"/>
+            <a:ext cx="7543800" cy="885480"/>
+          </a:xfrm>
+          <a:prstGeom prst="rect">
+            <a:avLst/>
+          </a:prstGeom>
+        </p:spPr>
+        <p:txBody>
+          <a:bodyPr vert="horz" lIns="91440" tIns="45720" rIns="91440" bIns="45720" rtlCol="0" anchor="b">
+            <a:normAutofit/>
+          </a:bodyPr>
+          <a:lstStyle>
+            <a:lvl1pPr algn="l" defTabSz="914400" rtl="0" eaLnBrk="1" latinLnBrk="0" hangingPunct="1">
+              <a:lnSpc>
+                <a:spcPct val="85000"/>
+              </a:lnSpc>
+              <a:spcBef>
+                <a:spcPct val="0"/>
+              </a:spcBef>
+              <a:buNone/>
+              <a:defRPr sz="4800" kern="1200" spc="-50" baseline="0">
+                <a:solidFill>
+                  <a:schemeClr val="tx1">
+                    <a:lumMod val="75000"/>
+                    <a:lumOff val="25000"/>
+                  </a:schemeClr>
+                </a:solidFill>
+                <a:latin typeface="+mj-lt"/>
+                <a:ea typeface="+mj-ea"/>
+                <a:cs typeface="+mj-cs"/>
+              </a:defRPr>
+            </a:lvl1pPr>
+          </a:lstStyle>
+          <a:p>
+            <a:r>
+              <a:rPr lang="en-US" dirty="0" smtClean="0"/>
+              <a:t>Some Android History</a:t>
+            </a:r>
+            <a:endParaRPr lang="en-US" dirty="0"/>
+          </a:p>
+        </p:txBody>
+      </p:sp>
+      <p:graphicFrame>
+        <p:nvGraphicFramePr>
+          <p:cNvPr id="3" name="Table 2"/>
+          <p:cNvGraphicFramePr>
+            <a:graphicFrameLocks noGrp="1"/>
+          </p:cNvGraphicFramePr>
+          <p:nvPr>
+            <p:extLst>
+              <p:ext uri="{D42A27DB-BD31-4B8C-83A1-F6EECF244321}">
+                <p14:modId xmlns:p14="http://schemas.microsoft.com/office/powerpoint/2010/main" val="191466188"/>
+              </p:ext>
+            </p:extLst>
+          </p:nvPr>
+        </p:nvGraphicFramePr>
+        <p:xfrm>
+          <a:off x="800100" y="1316990"/>
+          <a:ext cx="4696459" cy="518160"/>
+        </p:xfrm>
+        <a:graphic>
+          <a:graphicData uri="http://schemas.openxmlformats.org/drawingml/2006/table">
+            <a:tbl>
+              <a:tblPr firstRow="1" bandRow="1">
+                <a:tableStyleId>{2D5ABB26-0587-4C30-8999-92F81FD0307C}</a:tableStyleId>
+              </a:tblPr>
+              <a:tblGrid>
+                <a:gridCol w="959839"/>
+                <a:gridCol w="3736620"/>
+              </a:tblGrid>
+              <a:tr h="370840">
+                <a:tc>
+                  <a:txBody>
+                    <a:bodyPr/>
+                    <a:lstStyle/>
+                    <a:p>
+                      <a:r>
+                        <a:rPr lang="en-US" sz="2800" b="1" dirty="0" smtClean="0"/>
+                        <a:t>2014</a:t>
+                      </a:r>
+                      <a:endParaRPr lang="en-US" sz="2800" b="1" dirty="0"/>
+                    </a:p>
+                  </a:txBody>
+                  <a:tcPr>
+                    <a:lnL>
+                      <a:noFill/>
+                    </a:lnL>
+                    <a:lnR>
+                      <a:noFill/>
+                    </a:lnR>
+                    <a:lnT>
+                      <a:noFill/>
+                    </a:lnT>
+                    <a:lnB>
+                      <a:noFill/>
+                    </a:lnB>
+                    <a:lnTlToBr w="12700" cmpd="sng">
+                      <a:noFill/>
+                      <a:prstDash val="solid"/>
+                    </a:lnTlToBr>
+                    <a:lnBlToTr w="12700" cmpd="sng">
+                      <a:noFill/>
+                      <a:prstDash val="solid"/>
+                    </a:lnBlToTr>
+                  </a:tcPr>
+                </a:tc>
+                <a:tc>
+                  <a:txBody>
+                    <a:bodyPr/>
+                    <a:lstStyle/>
+                    <a:p>
+                      <a:r>
+                        <a:rPr lang="en-US" sz="2800" dirty="0" smtClean="0"/>
+                        <a:t>Android One</a:t>
+                      </a:r>
+                      <a:endParaRPr lang="en-US" sz="2800" baseline="0" dirty="0" smtClean="0"/>
+                    </a:p>
+                  </a:txBody>
+                  <a:tcPr>
+                    <a:lnL>
+                      <a:noFill/>
+                    </a:lnL>
+                  </a:tcPr>
+                </a:tc>
+              </a:tr>
+            </a:tbl>
+          </a:graphicData>
+        </a:graphic>
+      </p:graphicFrame>
+      <p:graphicFrame>
+        <p:nvGraphicFramePr>
+          <p:cNvPr id="14" name="Table 13"/>
+          <p:cNvGraphicFramePr>
+            <a:graphicFrameLocks noGrp="1"/>
+          </p:cNvGraphicFramePr>
+          <p:nvPr>
+            <p:extLst>
+              <p:ext uri="{D42A27DB-BD31-4B8C-83A1-F6EECF244321}">
+                <p14:modId xmlns:p14="http://schemas.microsoft.com/office/powerpoint/2010/main" val="2014563914"/>
+              </p:ext>
+            </p:extLst>
+          </p:nvPr>
+        </p:nvGraphicFramePr>
+        <p:xfrm>
+          <a:off x="800100" y="3244483"/>
+          <a:ext cx="4696459" cy="518160"/>
+        </p:xfrm>
+        <a:graphic>
+          <a:graphicData uri="http://schemas.openxmlformats.org/drawingml/2006/table">
+            <a:tbl>
+              <a:tblPr firstRow="1" bandRow="1">
+                <a:tableStyleId>{2D5ABB26-0587-4C30-8999-92F81FD0307C}</a:tableStyleId>
+              </a:tblPr>
+              <a:tblGrid>
+                <a:gridCol w="959839"/>
+                <a:gridCol w="3736620"/>
+              </a:tblGrid>
+              <a:tr h="0">
+                <a:tc>
+                  <a:txBody>
+                    <a:bodyPr/>
+                    <a:lstStyle/>
+                    <a:p>
+                      <a:r>
+                        <a:rPr lang="en-US" sz="2800" b="1" dirty="0" smtClean="0"/>
+                        <a:t>2015</a:t>
+                      </a:r>
+                      <a:endParaRPr lang="en-US" sz="2800" b="1" dirty="0"/>
+                    </a:p>
+                  </a:txBody>
+                  <a:tcPr/>
+                </a:tc>
+                <a:tc>
+                  <a:txBody>
+                    <a:bodyPr/>
+                    <a:lstStyle/>
+                    <a:p>
+                      <a:r>
+                        <a:rPr lang="en-US" sz="2800" dirty="0" smtClean="0"/>
+                        <a:t>Project </a:t>
+                      </a:r>
+                      <a:r>
+                        <a:rPr lang="en-US" sz="2800" dirty="0" err="1" smtClean="0"/>
+                        <a:t>Brillo</a:t>
+                      </a:r>
+                      <a:endParaRPr lang="en-US" sz="2000" dirty="0" smtClean="0"/>
+                    </a:p>
+                  </a:txBody>
+                  <a:tcPr/>
+                </a:tc>
+              </a:tr>
+            </a:tbl>
+          </a:graphicData>
+        </a:graphic>
+      </p:graphicFrame>
+      <p:pic>
+        <p:nvPicPr>
+          <p:cNvPr id="4" name="Picture 3"/>
+          <p:cNvPicPr>
+            <a:picLocks noChangeAspect="1"/>
+          </p:cNvPicPr>
+          <p:nvPr/>
+        </p:nvPicPr>
+        <p:blipFill>
+          <a:blip r:embed="rId2">
+            <a:extLst>
+              <a:ext uri="{28A0092B-C50C-407E-A947-70E740481C1C}">
+                <a14:useLocalDpi xmlns:a14="http://schemas.microsoft.com/office/drawing/2010/main" val="0"/>
+              </a:ext>
+            </a:extLst>
+          </a:blip>
+          <a:stretch>
+            <a:fillRect/>
+          </a:stretch>
+        </p:blipFill>
+        <p:spPr>
+          <a:xfrm>
+            <a:off x="4138863" y="1861697"/>
+            <a:ext cx="4051568" cy="526178"/>
+          </a:xfrm>
+          <a:prstGeom prst="rect">
+            <a:avLst/>
+          </a:prstGeom>
+        </p:spPr>
+      </p:pic>
+      <p:pic>
+        <p:nvPicPr>
+          <p:cNvPr id="5" name="Picture 4"/>
+          <p:cNvPicPr>
+            <a:picLocks noChangeAspect="1"/>
+          </p:cNvPicPr>
+          <p:nvPr/>
+        </p:nvPicPr>
+        <p:blipFill>
+          <a:blip r:embed="rId3">
+            <a:extLst>
+              <a:ext uri="{28A0092B-C50C-407E-A947-70E740481C1C}">
+                <a14:useLocalDpi xmlns:a14="http://schemas.microsoft.com/office/drawing/2010/main" val="0"/>
+              </a:ext>
+            </a:extLst>
+          </a:blip>
+          <a:stretch>
+            <a:fillRect/>
+          </a:stretch>
+        </p:blipFill>
+        <p:spPr>
+          <a:xfrm>
+            <a:off x="4138863" y="3921158"/>
+            <a:ext cx="3656932" cy="2179697"/>
+          </a:xfrm>
+          <a:prstGeom prst="rect">
+            <a:avLst/>
+          </a:prstGeom>
+        </p:spPr>
+      </p:pic>
+    </p:spTree>
+    <p:extLst>
+      <p:ext uri="{BB962C8B-B14F-4D97-AF65-F5344CB8AC3E}">
+        <p14:creationId xmlns:p14="http://schemas.microsoft.com/office/powerpoint/2010/main" val="612912115"/>
+      </p:ext>
+    </p:extLst>
+  </p:cSld>
+  <p:clrMapOvr>
+    <a:masterClrMapping/>
+  </p:clrMapOvr>
+  <p:timing>
+    <p:tnLst>
+      <p:par>
+        <p:cTn id="1" dur="indefinite" restart="never" nodeType="tmRoot">
+          <p:childTnLst>
+            <p:seq concurrent="1" nextAc="seek">
+              <p:cTn id="2" dur="indefinite" nodeType="mainSeq">
+                <p:childTnLst>
+                  <p:par>
+                    <p:cTn id="3" fill="hold">
+                      <p:stCondLst>
+                        <p:cond delay="indefinite"/>
+                      </p:stCondLst>
+                      <p:childTnLst>
+                        <p:par>
+                          <p:cTn id="4" fill="hold">
+                            <p:stCondLst>
+                              <p:cond delay="0"/>
+                            </p:stCondLst>
+                            <p:childTnLst>
+                              <p:par>
+                                <p:cTn id="5" presetID="1" presetClass="entr" presetSubtype="0" fill="hold" nodeType="clickEffect">
+                                  <p:stCondLst>
+                                    <p:cond delay="0"/>
+                                  </p:stCondLst>
+                                  <p:childTnLst>
+                                    <p:set>
+                                      <p:cBhvr>
+                                        <p:cTn id="6" dur="1" fill="hold">
+                                          <p:stCondLst>
+                                            <p:cond delay="0"/>
+                                          </p:stCondLst>
+                                        </p:cTn>
+                                        <p:tgtEl>
+                                          <p:spTgt spid="14"/>
+                                        </p:tgtEl>
+                                        <p:attrNameLst>
+                                          <p:attrName>style.visibility</p:attrName>
+                                        </p:attrNameLst>
+                                      </p:cBhvr>
+                                      <p:to>
+                                        <p:strVal val="visible"/>
+                                      </p:to>
+                                    </p:set>
+                                  </p:childTnLst>
+                                </p:cTn>
+                              </p:par>
+                              <p:par>
+                                <p:cTn id="7" presetID="1" presetClass="entr" presetSubtype="0" fill="hold" nodeType="withEffect">
+                                  <p:stCondLst>
+                                    <p:cond delay="0"/>
+                                  </p:stCondLst>
+                                  <p:childTnLst>
+                                    <p:set>
+                                      <p:cBhvr>
+                                        <p:cTn id="8" dur="1" fill="hold">
+                                          <p:stCondLst>
+                                            <p:cond delay="0"/>
+                                          </p:stCondLst>
+                                        </p:cTn>
+                                        <p:tgtEl>
+                                          <p:spTgt spid="5"/>
+                                        </p:tgtEl>
+                                        <p:attrNameLst>
+                                          <p:attrName>style.visibility</p:attrName>
+                                        </p:attrNameLst>
+                                      </p:cBhvr>
+                                      <p:to>
+                                        <p:strVal val="visible"/>
+                                      </p:to>
+                                    </p:set>
+                                  </p:childTnLst>
+                                </p:cTn>
+                              </p:par>
+                            </p:childTnLst>
+                          </p:cTn>
+                        </p:par>
+                      </p:childTnLst>
+                    </p:cTn>
+                  </p:par>
+                </p:childTnLst>
+              </p:cTn>
+              <p:prevCondLst>
+                <p:cond evt="onPrev" delay="0">
+                  <p:tgtEl>
+                    <p:sldTgt/>
+                  </p:tgtEl>
+                </p:cond>
+              </p:prevCondLst>
+              <p:nextCondLst>
+                <p:cond evt="onNext" delay="0">
+                  <p:tgtEl>
+                    <p:sldTgt/>
+                  </p:tgtEl>
+                </p:cond>
+              </p:nextCondLst>
+            </p:seq>
+          </p:childTnLst>
+        </p:cTn>
+      </p:par>
+    </p:tnLst>
+  </p:timing>
+</p:sld>
+</file>
+
+<file path=ppt/slides/slide11.xml><?xml version="1.0" encoding="utf-8"?>
 <p:sld xmlns:a="http://schemas.openxmlformats.org/drawingml/2006/main" xmlns:r="http://schemas.openxmlformats.org/officeDocument/2006/relationships" xmlns:p="http://schemas.openxmlformats.org/presentationml/2006/main">
   <p:cSld>
     <p:spTree>
@@ -9721,7 +10126,7 @@
 </p:sld>
 </file>
 
-<file path=ppt/slides/slide11.xml><?xml version="1.0" encoding="utf-8"?>
+<file path=ppt/slides/slide12.xml><?xml version="1.0" encoding="utf-8"?>
 <p:sld xmlns:a="http://schemas.openxmlformats.org/drawingml/2006/main" xmlns:r="http://schemas.openxmlformats.org/officeDocument/2006/relationships" xmlns:p="http://schemas.openxmlformats.org/presentationml/2006/main">
   <p:cSld>
     <p:spTree>
@@ -10602,7 +11007,7 @@
 </p:sld>
 </file>
 
-<file path=ppt/slides/slide12.xml><?xml version="1.0" encoding="utf-8"?>
+<file path=ppt/slides/slide13.xml><?xml version="1.0" encoding="utf-8"?>
 <p:sld xmlns:a="http://schemas.openxmlformats.org/drawingml/2006/main" xmlns:r="http://schemas.openxmlformats.org/officeDocument/2006/relationships" xmlns:p="http://schemas.openxmlformats.org/presentationml/2006/main">
   <p:cSld>
     <p:spTree>
@@ -10735,7 +11140,7 @@
 </p:sld>
 </file>
 
-<file path=ppt/slides/slide13.xml><?xml version="1.0" encoding="utf-8"?>
+<file path=ppt/slides/slide14.xml><?xml version="1.0" encoding="utf-8"?>
 <p:sld xmlns:a="http://schemas.openxmlformats.org/drawingml/2006/main" xmlns:r="http://schemas.openxmlformats.org/officeDocument/2006/relationships" xmlns:p="http://schemas.openxmlformats.org/presentationml/2006/main">
   <p:cSld>
     <p:spTree>
@@ -11020,7 +11425,7 @@
 </p:sld>
 </file>
 
-<file path=ppt/slides/slide14.xml><?xml version="1.0" encoding="utf-8"?>
+<file path=ppt/slides/slide15.xml><?xml version="1.0" encoding="utf-8"?>
 <p:sld xmlns:a="http://schemas.openxmlformats.org/drawingml/2006/main" xmlns:r="http://schemas.openxmlformats.org/officeDocument/2006/relationships" xmlns:p="http://schemas.openxmlformats.org/presentationml/2006/main">
   <p:cSld>
     <p:spTree>
@@ -11413,7 +11818,7 @@
 </p:sld>
 </file>
 
-<file path=ppt/slides/slide15.xml><?xml version="1.0" encoding="utf-8"?>
+<file path=ppt/slides/slide16.xml><?xml version="1.0" encoding="utf-8"?>
 <p:sld xmlns:a="http://schemas.openxmlformats.org/drawingml/2006/main" xmlns:r="http://schemas.openxmlformats.org/officeDocument/2006/relationships" xmlns:p="http://schemas.openxmlformats.org/presentationml/2006/main">
   <p:cSld>
     <p:bg>
@@ -11488,7 +11893,7 @@
 </p:sld>
 </file>
 
-<file path=ppt/slides/slide16.xml><?xml version="1.0" encoding="utf-8"?>
+<file path=ppt/slides/slide17.xml><?xml version="1.0" encoding="utf-8"?>
 <p:sld xmlns:a="http://schemas.openxmlformats.org/drawingml/2006/main" xmlns:r="http://schemas.openxmlformats.org/officeDocument/2006/relationships" xmlns:p="http://schemas.openxmlformats.org/presentationml/2006/main">
   <p:cSld>
     <p:spTree>
@@ -11592,7 +11997,7 @@
 </p:sld>
 </file>
 
-<file path=ppt/slides/slide17.xml><?xml version="1.0" encoding="utf-8"?>
+<file path=ppt/slides/slide18.xml><?xml version="1.0" encoding="utf-8"?>
 <p:sld xmlns:a="http://schemas.openxmlformats.org/drawingml/2006/main" xmlns:r="http://schemas.openxmlformats.org/officeDocument/2006/relationships" xmlns:p="http://schemas.openxmlformats.org/presentationml/2006/main">
   <p:cSld>
     <p:spTree>
@@ -11819,7 +12224,7 @@
 </p:sld>
 </file>
 
-<file path=ppt/slides/slide18.xml><?xml version="1.0" encoding="utf-8"?>
+<file path=ppt/slides/slide19.xml><?xml version="1.0" encoding="utf-8"?>
 <p:sld xmlns:a="http://schemas.openxmlformats.org/drawingml/2006/main" xmlns:r="http://schemas.openxmlformats.org/officeDocument/2006/relationships" xmlns:p="http://schemas.openxmlformats.org/presentationml/2006/main">
   <p:cSld>
     <p:spTree>
@@ -12026,7 +12431,185 @@
 </p:sld>
 </file>
 
-<file path=ppt/slides/slide19.xml><?xml version="1.0" encoding="utf-8"?>
+<file path=ppt/slides/slide2.xml><?xml version="1.0" encoding="utf-8"?>
+<p:sld xmlns:a="http://schemas.openxmlformats.org/drawingml/2006/main" xmlns:r="http://schemas.openxmlformats.org/officeDocument/2006/relationships" xmlns:p="http://schemas.openxmlformats.org/presentationml/2006/main">
+  <p:cSld>
+    <p:spTree>
+      <p:nvGrpSpPr>
+        <p:cNvPr id="1" name=""/>
+        <p:cNvGrpSpPr/>
+        <p:nvPr/>
+      </p:nvGrpSpPr>
+      <p:grpSpPr>
+        <a:xfrm>
+          <a:off x="0" y="0"/>
+          <a:ext cx="0" cy="0"/>
+          <a:chOff x="0" y="0"/>
+          <a:chExt cx="0" cy="0"/>
+        </a:xfrm>
+      </p:grpSpPr>
+      <p:sp>
+        <p:nvSpPr>
+          <p:cNvPr id="4" name="Title 3"/>
+          <p:cNvSpPr>
+            <a:spLocks noGrp="1"/>
+          </p:cNvSpPr>
+          <p:nvPr>
+            <p:ph type="title"/>
+          </p:nvPr>
+        </p:nvSpPr>
+        <p:spPr/>
+        <p:txBody>
+          <a:bodyPr/>
+          <a:lstStyle/>
+          <a:p>
+            <a:r>
+              <a:rPr lang="en-US" dirty="0" smtClean="0"/>
+              <a:t>Plan for the Day</a:t>
+            </a:r>
+            <a:endParaRPr lang="en-US" dirty="0"/>
+          </a:p>
+        </p:txBody>
+      </p:sp>
+      <p:sp>
+        <p:nvSpPr>
+          <p:cNvPr id="5" name="Content Placeholder 4"/>
+          <p:cNvSpPr>
+            <a:spLocks noGrp="1"/>
+          </p:cNvSpPr>
+          <p:nvPr>
+            <p:ph idx="1"/>
+          </p:nvPr>
+        </p:nvSpPr>
+        <p:spPr/>
+        <p:txBody>
+          <a:bodyPr/>
+          <a:lstStyle/>
+          <a:p>
+            <a:pPr marL="457200" indent="-457200">
+              <a:lnSpc>
+                <a:spcPct val="100000"/>
+              </a:lnSpc>
+              <a:spcBef>
+                <a:spcPts val="0"/>
+              </a:spcBef>
+              <a:spcAft>
+                <a:spcPts val="0"/>
+              </a:spcAft>
+              <a:buClrTx/>
+              <a:buSzTx/>
+              <a:buFont typeface="+mj-lt"/>
+              <a:buAutoNum type="arabicPeriod"/>
+            </a:pPr>
+            <a:r>
+              <a:rPr lang="en-US" dirty="0" smtClean="0"/>
+              <a:t>Introductions and syllabus</a:t>
+            </a:r>
+          </a:p>
+          <a:p>
+            <a:pPr marL="457200" indent="-457200">
+              <a:lnSpc>
+                <a:spcPct val="100000"/>
+              </a:lnSpc>
+              <a:spcBef>
+                <a:spcPts val="0"/>
+              </a:spcBef>
+              <a:spcAft>
+                <a:spcPts val="0"/>
+              </a:spcAft>
+              <a:buClrTx/>
+              <a:buSzTx/>
+              <a:buFont typeface="+mj-lt"/>
+              <a:buAutoNum type="arabicPeriod"/>
+            </a:pPr>
+            <a:r>
+              <a:rPr lang="en-US" dirty="0" smtClean="0"/>
+              <a:t>Android History</a:t>
+            </a:r>
+          </a:p>
+          <a:p>
+            <a:pPr marL="457200" indent="-457200">
+              <a:lnSpc>
+                <a:spcPct val="100000"/>
+              </a:lnSpc>
+              <a:spcBef>
+                <a:spcPts val="0"/>
+              </a:spcBef>
+              <a:spcAft>
+                <a:spcPts val="0"/>
+              </a:spcAft>
+              <a:buClrTx/>
+              <a:buSzTx/>
+              <a:buFont typeface="+mj-lt"/>
+              <a:buAutoNum type="arabicPeriod"/>
+            </a:pPr>
+            <a:r>
+              <a:rPr lang="en-US" dirty="0" smtClean="0"/>
+              <a:t>break!</a:t>
+            </a:r>
+          </a:p>
+          <a:p>
+            <a:pPr marL="457200" indent="-457200">
+              <a:lnSpc>
+                <a:spcPct val="100000"/>
+              </a:lnSpc>
+              <a:spcBef>
+                <a:spcPts val="0"/>
+              </a:spcBef>
+              <a:spcAft>
+                <a:spcPts val="0"/>
+              </a:spcAft>
+              <a:buClrTx/>
+              <a:buSzTx/>
+              <a:buFont typeface="+mj-lt"/>
+              <a:buAutoNum type="arabicPeriod"/>
+            </a:pPr>
+            <a:r>
+              <a:rPr lang="en-US" dirty="0" smtClean="0"/>
+              <a:t>Getting Started: "Hello World"</a:t>
+            </a:r>
+          </a:p>
+          <a:p>
+            <a:pPr marL="457200" indent="-457200">
+              <a:lnSpc>
+                <a:spcPct val="100000"/>
+              </a:lnSpc>
+              <a:spcBef>
+                <a:spcPts val="0"/>
+              </a:spcBef>
+              <a:spcAft>
+                <a:spcPts val="0"/>
+              </a:spcAft>
+              <a:buClrTx/>
+              <a:buSzTx/>
+              <a:buFont typeface="+mj-lt"/>
+              <a:buAutoNum type="arabicPeriod"/>
+            </a:pPr>
+            <a:endParaRPr lang="en-US" dirty="0" smtClean="0"/>
+          </a:p>
+        </p:txBody>
+      </p:sp>
+    </p:spTree>
+    <p:extLst>
+      <p:ext uri="{BB962C8B-B14F-4D97-AF65-F5344CB8AC3E}">
+        <p14:creationId xmlns:p14="http://schemas.microsoft.com/office/powerpoint/2010/main" val="327322714"/>
+      </p:ext>
+    </p:extLst>
+  </p:cSld>
+  <p:clrMapOvr>
+    <a:masterClrMapping/>
+  </p:clrMapOvr>
+  <p:timing>
+    <p:tnLst>
+      <p:par>
+        <p:cTn id="1" dur="indefinite" restart="never" nodeType="tmRoot"/>
+      </p:par>
+    </p:tnLst>
+  </p:timing>
+</p:sld>
+</file>
+
+<file path=ppt/slides/slide20.xml><?xml version="1.0" encoding="utf-8"?>
 <p:sld xmlns:a="http://schemas.openxmlformats.org/drawingml/2006/main" xmlns:r="http://schemas.openxmlformats.org/officeDocument/2006/relationships" xmlns:p="http://schemas.openxmlformats.org/presentationml/2006/main">
   <p:cSld>
     <p:spTree>
@@ -12180,178 +12763,7 @@
 </p:sld>
 </file>
 
-<file path=ppt/slides/slide2.xml><?xml version="1.0" encoding="utf-8"?>
-<p:sld xmlns:a="http://schemas.openxmlformats.org/drawingml/2006/main" xmlns:r="http://schemas.openxmlformats.org/officeDocument/2006/relationships" xmlns:p="http://schemas.openxmlformats.org/presentationml/2006/main">
-  <p:cSld>
-    <p:spTree>
-      <p:nvGrpSpPr>
-        <p:cNvPr id="1" name=""/>
-        <p:cNvGrpSpPr/>
-        <p:nvPr/>
-      </p:nvGrpSpPr>
-      <p:grpSpPr>
-        <a:xfrm>
-          <a:off x="0" y="0"/>
-          <a:ext cx="0" cy="0"/>
-          <a:chOff x="0" y="0"/>
-          <a:chExt cx="0" cy="0"/>
-        </a:xfrm>
-      </p:grpSpPr>
-      <p:sp>
-        <p:nvSpPr>
-          <p:cNvPr id="4" name="Title 3"/>
-          <p:cNvSpPr>
-            <a:spLocks noGrp="1"/>
-          </p:cNvSpPr>
-          <p:nvPr>
-            <p:ph type="title"/>
-          </p:nvPr>
-        </p:nvSpPr>
-        <p:spPr/>
-        <p:txBody>
-          <a:bodyPr/>
-          <a:lstStyle/>
-          <a:p>
-            <a:r>
-              <a:rPr lang="en-US" dirty="0" smtClean="0"/>
-              <a:t>Plan for the Day</a:t>
-            </a:r>
-            <a:endParaRPr lang="en-US" dirty="0"/>
-          </a:p>
-        </p:txBody>
-      </p:sp>
-      <p:sp>
-        <p:nvSpPr>
-          <p:cNvPr id="5" name="Content Placeholder 4"/>
-          <p:cNvSpPr>
-            <a:spLocks noGrp="1"/>
-          </p:cNvSpPr>
-          <p:nvPr>
-            <p:ph idx="1"/>
-          </p:nvPr>
-        </p:nvSpPr>
-        <p:spPr/>
-        <p:txBody>
-          <a:bodyPr/>
-          <a:lstStyle/>
-          <a:p>
-            <a:pPr marL="457200" indent="-457200">
-              <a:lnSpc>
-                <a:spcPct val="100000"/>
-              </a:lnSpc>
-              <a:spcBef>
-                <a:spcPts val="0"/>
-              </a:spcBef>
-              <a:spcAft>
-                <a:spcPts val="0"/>
-              </a:spcAft>
-              <a:buClrTx/>
-              <a:buSzTx/>
-              <a:buFont typeface="+mj-lt"/>
-              <a:buAutoNum type="arabicPeriod"/>
-            </a:pPr>
-            <a:r>
-              <a:rPr lang="en-US" dirty="0" smtClean="0"/>
-              <a:t>Introductions and syllabus</a:t>
-            </a:r>
-          </a:p>
-          <a:p>
-            <a:pPr marL="457200" indent="-457200">
-              <a:lnSpc>
-                <a:spcPct val="100000"/>
-              </a:lnSpc>
-              <a:spcBef>
-                <a:spcPts val="0"/>
-              </a:spcBef>
-              <a:spcAft>
-                <a:spcPts val="0"/>
-              </a:spcAft>
-              <a:buClrTx/>
-              <a:buSzTx/>
-              <a:buFont typeface="+mj-lt"/>
-              <a:buAutoNum type="arabicPeriod"/>
-            </a:pPr>
-            <a:r>
-              <a:rPr lang="en-US" dirty="0" smtClean="0"/>
-              <a:t>Android History</a:t>
-            </a:r>
-          </a:p>
-          <a:p>
-            <a:pPr marL="457200" indent="-457200">
-              <a:lnSpc>
-                <a:spcPct val="100000"/>
-              </a:lnSpc>
-              <a:spcBef>
-                <a:spcPts val="0"/>
-              </a:spcBef>
-              <a:spcAft>
-                <a:spcPts val="0"/>
-              </a:spcAft>
-              <a:buClrTx/>
-              <a:buSzTx/>
-              <a:buFont typeface="+mj-lt"/>
-              <a:buAutoNum type="arabicPeriod"/>
-            </a:pPr>
-            <a:r>
-              <a:rPr lang="en-US" dirty="0" smtClean="0"/>
-              <a:t>break!</a:t>
-            </a:r>
-          </a:p>
-          <a:p>
-            <a:pPr marL="457200" indent="-457200">
-              <a:lnSpc>
-                <a:spcPct val="100000"/>
-              </a:lnSpc>
-              <a:spcBef>
-                <a:spcPts val="0"/>
-              </a:spcBef>
-              <a:spcAft>
-                <a:spcPts val="0"/>
-              </a:spcAft>
-              <a:buClrTx/>
-              <a:buSzTx/>
-              <a:buFont typeface="+mj-lt"/>
-              <a:buAutoNum type="arabicPeriod"/>
-            </a:pPr>
-            <a:r>
-              <a:rPr lang="en-US" dirty="0" smtClean="0"/>
-              <a:t>Getting Started: "Hello World"</a:t>
-            </a:r>
-          </a:p>
-          <a:p>
-            <a:pPr marL="457200" indent="-457200">
-              <a:lnSpc>
-                <a:spcPct val="100000"/>
-              </a:lnSpc>
-              <a:spcBef>
-                <a:spcPts val="0"/>
-              </a:spcBef>
-              <a:spcAft>
-                <a:spcPts val="0"/>
-              </a:spcAft>
-              <a:buClrTx/>
-              <a:buSzTx/>
-              <a:buFont typeface="+mj-lt"/>
-              <a:buAutoNum type="arabicPeriod"/>
-            </a:pPr>
-            <a:endParaRPr lang="en-US" dirty="0" smtClean="0"/>
-          </a:p>
-        </p:txBody>
-      </p:sp>
-    </p:spTree>
-    <p:extLst>
-      <p:ext uri="{BB962C8B-B14F-4D97-AF65-F5344CB8AC3E}">
-        <p14:creationId xmlns:p14="http://schemas.microsoft.com/office/powerpoint/2010/main" val="327322714"/>
-      </p:ext>
-    </p:extLst>
-  </p:cSld>
-  <p:clrMapOvr>
-    <a:masterClrMapping/>
-  </p:clrMapOvr>
-</p:sld>
-</file>
-
-<file path=ppt/slides/slide20.xml><?xml version="1.0" encoding="utf-8"?>
+<file path=ppt/slides/slide21.xml><?xml version="1.0" encoding="utf-8"?>
 <p:sld xmlns:a="http://schemas.openxmlformats.org/drawingml/2006/main" xmlns:r="http://schemas.openxmlformats.org/officeDocument/2006/relationships" xmlns:p="http://schemas.openxmlformats.org/presentationml/2006/main">
   <p:cSld>
     <p:spTree>
@@ -12945,7 +13357,7 @@
 </p:sld>
 </file>
 
-<file path=ppt/slides/slide21.xml><?xml version="1.0" encoding="utf-8"?>
+<file path=ppt/slides/slide22.xml><?xml version="1.0" encoding="utf-8"?>
 <p:sld xmlns:a="http://schemas.openxmlformats.org/drawingml/2006/main" xmlns:r="http://schemas.openxmlformats.org/officeDocument/2006/relationships" xmlns:p="http://schemas.openxmlformats.org/presentationml/2006/main">
   <p:cSld>
     <p:spTree>
@@ -13099,282 +13511,14 @@
   <p:timing>
     <p:tnLst>
       <p:par>
-        <p:cTn id="1" dur="indefinite" restart="never" nodeType="tmRoot">
-          <p:childTnLst>
-            <p:seq concurrent="1" nextAc="seek">
-              <p:cTn id="2" dur="indefinite" nodeType="mainSeq">
-                <p:childTnLst>
-                  <p:par>
-                    <p:cTn id="3" fill="hold">
-                      <p:stCondLst>
-                        <p:cond delay="indefinite"/>
-                      </p:stCondLst>
-                      <p:childTnLst>
-                        <p:par>
-                          <p:cTn id="4" fill="hold">
-                            <p:stCondLst>
-                              <p:cond delay="0"/>
-                            </p:stCondLst>
-                            <p:childTnLst>
-                              <p:par>
-                                <p:cTn id="5" presetID="1" presetClass="entr" presetSubtype="0" fill="hold" nodeType="clickEffect">
-                                  <p:stCondLst>
-                                    <p:cond delay="0"/>
-                                  </p:stCondLst>
-                                  <p:childTnLst>
-                                    <p:set>
-                                      <p:cBhvr>
-                                        <p:cTn id="6" dur="1" fill="hold">
-                                          <p:stCondLst>
-                                            <p:cond delay="0"/>
-                                          </p:stCondLst>
-                                        </p:cTn>
-                                        <p:tgtEl>
-                                          <p:spTgt spid="4">
-                                            <p:txEl>
-                                              <p:pRg st="0" end="0"/>
-                                            </p:txEl>
-                                          </p:spTgt>
-                                        </p:tgtEl>
-                                        <p:attrNameLst>
-                                          <p:attrName>style.visibility</p:attrName>
-                                        </p:attrNameLst>
-                                      </p:cBhvr>
-                                      <p:to>
-                                        <p:strVal val="visible"/>
-                                      </p:to>
-                                    </p:set>
-                                  </p:childTnLst>
-                                </p:cTn>
-                              </p:par>
-                            </p:childTnLst>
-                          </p:cTn>
-                        </p:par>
-                      </p:childTnLst>
-                    </p:cTn>
-                  </p:par>
-                  <p:par>
-                    <p:cTn id="7" fill="hold">
-                      <p:stCondLst>
-                        <p:cond delay="indefinite"/>
-                      </p:stCondLst>
-                      <p:childTnLst>
-                        <p:par>
-                          <p:cTn id="8" fill="hold">
-                            <p:stCondLst>
-                              <p:cond delay="0"/>
-                            </p:stCondLst>
-                            <p:childTnLst>
-                              <p:par>
-                                <p:cTn id="9" presetID="1" presetClass="entr" presetSubtype="0" fill="hold" nodeType="clickEffect">
-                                  <p:stCondLst>
-                                    <p:cond delay="0"/>
-                                  </p:stCondLst>
-                                  <p:childTnLst>
-                                    <p:set>
-                                      <p:cBhvr>
-                                        <p:cTn id="10" dur="1" fill="hold">
-                                          <p:stCondLst>
-                                            <p:cond delay="0"/>
-                                          </p:stCondLst>
-                                        </p:cTn>
-                                        <p:tgtEl>
-                                          <p:spTgt spid="4">
-                                            <p:txEl>
-                                              <p:pRg st="1" end="1"/>
-                                            </p:txEl>
-                                          </p:spTgt>
-                                        </p:tgtEl>
-                                        <p:attrNameLst>
-                                          <p:attrName>style.visibility</p:attrName>
-                                        </p:attrNameLst>
-                                      </p:cBhvr>
-                                      <p:to>
-                                        <p:strVal val="visible"/>
-                                      </p:to>
-                                    </p:set>
-                                  </p:childTnLst>
-                                </p:cTn>
-                              </p:par>
-                            </p:childTnLst>
-                          </p:cTn>
-                        </p:par>
-                      </p:childTnLst>
-                    </p:cTn>
-                  </p:par>
-                  <p:par>
-                    <p:cTn id="11" fill="hold">
-                      <p:stCondLst>
-                        <p:cond delay="indefinite"/>
-                      </p:stCondLst>
-                      <p:childTnLst>
-                        <p:par>
-                          <p:cTn id="12" fill="hold">
-                            <p:stCondLst>
-                              <p:cond delay="0"/>
-                            </p:stCondLst>
-                            <p:childTnLst>
-                              <p:par>
-                                <p:cTn id="13" presetID="1" presetClass="entr" presetSubtype="0" fill="hold" nodeType="clickEffect">
-                                  <p:stCondLst>
-                                    <p:cond delay="0"/>
-                                  </p:stCondLst>
-                                  <p:childTnLst>
-                                    <p:set>
-                                      <p:cBhvr>
-                                        <p:cTn id="14" dur="1" fill="hold">
-                                          <p:stCondLst>
-                                            <p:cond delay="0"/>
-                                          </p:stCondLst>
-                                        </p:cTn>
-                                        <p:tgtEl>
-                                          <p:spTgt spid="4">
-                                            <p:txEl>
-                                              <p:pRg st="2" end="2"/>
-                                            </p:txEl>
-                                          </p:spTgt>
-                                        </p:tgtEl>
-                                        <p:attrNameLst>
-                                          <p:attrName>style.visibility</p:attrName>
-                                        </p:attrNameLst>
-                                      </p:cBhvr>
-                                      <p:to>
-                                        <p:strVal val="visible"/>
-                                      </p:to>
-                                    </p:set>
-                                  </p:childTnLst>
-                                </p:cTn>
-                              </p:par>
-                            </p:childTnLst>
-                          </p:cTn>
-                        </p:par>
-                      </p:childTnLst>
-                    </p:cTn>
-                  </p:par>
-                  <p:par>
-                    <p:cTn id="15" fill="hold">
-                      <p:stCondLst>
-                        <p:cond delay="indefinite"/>
-                      </p:stCondLst>
-                      <p:childTnLst>
-                        <p:par>
-                          <p:cTn id="16" fill="hold">
-                            <p:stCondLst>
-                              <p:cond delay="0"/>
-                            </p:stCondLst>
-                            <p:childTnLst>
-                              <p:par>
-                                <p:cTn id="17" presetID="1" presetClass="entr" presetSubtype="0" fill="hold" nodeType="clickEffect">
-                                  <p:stCondLst>
-                                    <p:cond delay="0"/>
-                                  </p:stCondLst>
-                                  <p:childTnLst>
-                                    <p:set>
-                                      <p:cBhvr>
-                                        <p:cTn id="18" dur="1" fill="hold">
-                                          <p:stCondLst>
-                                            <p:cond delay="0"/>
-                                          </p:stCondLst>
-                                        </p:cTn>
-                                        <p:tgtEl>
-                                          <p:spTgt spid="4">
-                                            <p:txEl>
-                                              <p:pRg st="4" end="4"/>
-                                            </p:txEl>
-                                          </p:spTgt>
-                                        </p:tgtEl>
-                                        <p:attrNameLst>
-                                          <p:attrName>style.visibility</p:attrName>
-                                        </p:attrNameLst>
-                                      </p:cBhvr>
-                                      <p:to>
-                                        <p:strVal val="visible"/>
-                                      </p:to>
-                                    </p:set>
-                                  </p:childTnLst>
-                                </p:cTn>
-                              </p:par>
-                            </p:childTnLst>
-                          </p:cTn>
-                        </p:par>
-                      </p:childTnLst>
-                    </p:cTn>
-                  </p:par>
-                  <p:par>
-                    <p:cTn id="19" fill="hold">
-                      <p:stCondLst>
-                        <p:cond delay="indefinite"/>
-                      </p:stCondLst>
-                      <p:childTnLst>
-                        <p:par>
-                          <p:cTn id="20" fill="hold">
-                            <p:stCondLst>
-                              <p:cond delay="0"/>
-                            </p:stCondLst>
-                            <p:childTnLst>
-                              <p:par>
-                                <p:cTn id="21" presetID="1" presetClass="entr" presetSubtype="0" fill="hold" nodeType="clickEffect">
-                                  <p:stCondLst>
-                                    <p:cond delay="0"/>
-                                  </p:stCondLst>
-                                  <p:childTnLst>
-                                    <p:set>
-                                      <p:cBhvr>
-                                        <p:cTn id="22" dur="1" fill="hold">
-                                          <p:stCondLst>
-                                            <p:cond delay="0"/>
-                                          </p:stCondLst>
-                                        </p:cTn>
-                                        <p:tgtEl>
-                                          <p:spTgt spid="4">
-                                            <p:txEl>
-                                              <p:pRg st="5" end="5"/>
-                                            </p:txEl>
-                                          </p:spTgt>
-                                        </p:tgtEl>
-                                        <p:attrNameLst>
-                                          <p:attrName>style.visibility</p:attrName>
-                                        </p:attrNameLst>
-                                      </p:cBhvr>
-                                      <p:to>
-                                        <p:strVal val="visible"/>
-                                      </p:to>
-                                    </p:set>
-                                  </p:childTnLst>
-                                </p:cTn>
-                              </p:par>
-                            </p:childTnLst>
-                          </p:cTn>
-                        </p:par>
-                      </p:childTnLst>
-                    </p:cTn>
-                  </p:par>
-                </p:childTnLst>
-              </p:cTn>
-              <p:prevCondLst>
-                <p:cond evt="onPrev" delay="0">
-                  <p:tgtEl>
-                    <p:sldTgt/>
-                  </p:tgtEl>
-                </p:cond>
-              </p:prevCondLst>
-              <p:nextCondLst>
-                <p:cond evt="onNext" delay="0">
-                  <p:tgtEl>
-                    <p:sldTgt/>
-                  </p:tgtEl>
-                </p:cond>
-              </p:nextCondLst>
-            </p:seq>
-          </p:childTnLst>
-        </p:cTn>
+        <p:cTn id="1" dur="indefinite" restart="never" nodeType="tmRoot"/>
       </p:par>
     </p:tnLst>
   </p:timing>
 </p:sld>
 </file>
 
-<file path=ppt/slides/slide22.xml><?xml version="1.0" encoding="utf-8"?>
+<file path=ppt/slides/slide23.xml><?xml version="1.0" encoding="utf-8"?>
 <p:sld xmlns:a="http://schemas.openxmlformats.org/drawingml/2006/main" xmlns:r="http://schemas.openxmlformats.org/officeDocument/2006/relationships" xmlns:p="http://schemas.openxmlformats.org/presentationml/2006/main">
   <p:cSld>
     <p:spTree>
@@ -13899,7 +14043,7 @@
 </p:sld>
 </file>
 
-<file path=ppt/slides/slide23.xml><?xml version="1.0" encoding="utf-8"?>
+<file path=ppt/slides/slide24.xml><?xml version="1.0" encoding="utf-8"?>
 <p:sld xmlns:a="http://schemas.openxmlformats.org/drawingml/2006/main" xmlns:r="http://schemas.openxmlformats.org/officeDocument/2006/relationships" xmlns:p="http://schemas.openxmlformats.org/presentationml/2006/main">
   <p:cSld>
     <p:spTree>
@@ -13969,7 +14113,7 @@
         <p:spPr>
           <a:xfrm>
             <a:off x="956309" y="802640"/>
-            <a:ext cx="5886359" cy="2374900"/>
+            <a:ext cx="4714389" cy="1902059"/>
           </a:xfrm>
           <a:prstGeom prst="rect">
             <a:avLst/>
@@ -14103,6 +14247,13 @@
   <p:clrMapOvr>
     <a:masterClrMapping/>
   </p:clrMapOvr>
+  <p:timing>
+    <p:tnLst>
+      <p:par>
+        <p:cTn id="1" dur="indefinite" restart="never" nodeType="tmRoot"/>
+      </p:par>
+    </p:tnLst>
+  </p:timing>
 </p:sld>
 </file>
 
@@ -16500,7 +16651,7 @@
                                           </p:stCondLst>
                                         </p:cTn>
                                         <p:tgtEl>
-                                          <p:spTgt spid="3"/>
+                                          <p:spTgt spid="14"/>
                                         </p:tgtEl>
                                         <p:attrNameLst>
                                           <p:attrName>style.visibility</p:attrName>
@@ -16522,78 +16673,6 @@
                                     <p:set>
                                       <p:cBhvr>
                                         <p:cTn id="8" dur="1" fill="hold">
-                                          <p:stCondLst>
-                                            <p:cond delay="0"/>
-                                          </p:stCondLst>
-                                        </p:cTn>
-                                        <p:tgtEl>
-                                          <p:spTgt spid="8"/>
-                                        </p:tgtEl>
-                                        <p:attrNameLst>
-                                          <p:attrName>style.visibility</p:attrName>
-                                        </p:attrNameLst>
-                                      </p:cBhvr>
-                                      <p:to>
-                                        <p:strVal val="visible"/>
-                                      </p:to>
-                                    </p:set>
-                                  </p:childTnLst>
-                                </p:cTn>
-                              </p:par>
-                            </p:childTnLst>
-                          </p:cTn>
-                        </p:par>
-                      </p:childTnLst>
-                    </p:cTn>
-                  </p:par>
-                  <p:par>
-                    <p:cTn id="9" fill="hold">
-                      <p:stCondLst>
-                        <p:cond delay="indefinite"/>
-                      </p:stCondLst>
-                      <p:childTnLst>
-                        <p:par>
-                          <p:cTn id="10" fill="hold">
-                            <p:stCondLst>
-                              <p:cond delay="0"/>
-                            </p:stCondLst>
-                            <p:childTnLst>
-                              <p:par>
-                                <p:cTn id="11" presetID="1" presetClass="entr" presetSubtype="0" fill="hold" nodeType="clickEffect">
-                                  <p:stCondLst>
-                                    <p:cond delay="0"/>
-                                  </p:stCondLst>
-                                  <p:childTnLst>
-                                    <p:set>
-                                      <p:cBhvr>
-                                        <p:cTn id="12" dur="1" fill="hold">
-                                          <p:stCondLst>
-                                            <p:cond delay="0"/>
-                                          </p:stCondLst>
-                                        </p:cTn>
-                                        <p:tgtEl>
-                                          <p:spTgt spid="14"/>
-                                        </p:tgtEl>
-                                        <p:attrNameLst>
-                                          <p:attrName>style.visibility</p:attrName>
-                                        </p:attrNameLst>
-                                      </p:cBhvr>
-                                      <p:to>
-                                        <p:strVal val="visible"/>
-                                      </p:to>
-                                    </p:set>
-                                  </p:childTnLst>
-                                </p:cTn>
-                              </p:par>
-                              <p:par>
-                                <p:cTn id="13" presetID="1" presetClass="entr" presetSubtype="0" fill="hold" nodeType="withEffect">
-                                  <p:stCondLst>
-                                    <p:cond delay="0"/>
-                                  </p:stCondLst>
-                                  <p:childTnLst>
-                                    <p:set>
-                                      <p:cBhvr>
-                                        <p:cTn id="14" dur="1" fill="hold">
                                           <p:stCondLst>
                                             <p:cond delay="0"/>
                                           </p:stCondLst>

</xml_diff>